<commit_message>
se midio el porcentaje de uso del cpu
</commit_message>
<xml_diff>
--- a/projectsTP4/PPT/Control de Acceso + RTOS + CLOUD.pptx
+++ b/projectsTP4/PPT/Control de Acceso + RTOS + CLOUD.pptx
@@ -11,25 +11,26 @@
     <p:sldId id="277" r:id="rId5"/>
     <p:sldId id="276" r:id="rId6"/>
     <p:sldId id="279" r:id="rId7"/>
-    <p:sldId id="258" r:id="rId8"/>
-    <p:sldId id="257" r:id="rId9"/>
-    <p:sldId id="262" r:id="rId10"/>
-    <p:sldId id="259" r:id="rId11"/>
-    <p:sldId id="268" r:id="rId12"/>
-    <p:sldId id="269" r:id="rId13"/>
-    <p:sldId id="270" r:id="rId14"/>
-    <p:sldId id="260" r:id="rId15"/>
-    <p:sldId id="273" r:id="rId16"/>
-    <p:sldId id="272" r:id="rId17"/>
-    <p:sldId id="261" r:id="rId18"/>
-    <p:sldId id="263" r:id="rId19"/>
-    <p:sldId id="264" r:id="rId20"/>
-    <p:sldId id="265" r:id="rId21"/>
-    <p:sldId id="267" r:id="rId22"/>
-    <p:sldId id="278" r:id="rId23"/>
-    <p:sldId id="280" r:id="rId24"/>
-    <p:sldId id="281" r:id="rId25"/>
-    <p:sldId id="266" r:id="rId26"/>
+    <p:sldId id="282" r:id="rId8"/>
+    <p:sldId id="258" r:id="rId9"/>
+    <p:sldId id="257" r:id="rId10"/>
+    <p:sldId id="262" r:id="rId11"/>
+    <p:sldId id="259" r:id="rId12"/>
+    <p:sldId id="268" r:id="rId13"/>
+    <p:sldId id="269" r:id="rId14"/>
+    <p:sldId id="270" r:id="rId15"/>
+    <p:sldId id="260" r:id="rId16"/>
+    <p:sldId id="273" r:id="rId17"/>
+    <p:sldId id="272" r:id="rId18"/>
+    <p:sldId id="261" r:id="rId19"/>
+    <p:sldId id="263" r:id="rId20"/>
+    <p:sldId id="264" r:id="rId21"/>
+    <p:sldId id="265" r:id="rId22"/>
+    <p:sldId id="267" r:id="rId23"/>
+    <p:sldId id="278" r:id="rId24"/>
+    <p:sldId id="280" r:id="rId25"/>
+    <p:sldId id="281" r:id="rId26"/>
+    <p:sldId id="266" r:id="rId27"/>
   </p:sldIdLst>
   <p:sldSz cx="12192000" cy="6858000"/>
   <p:notesSz cx="6858000" cy="9144000"/>
@@ -139,6 +140,7 @@
             <p14:sldId id="277"/>
             <p14:sldId id="276"/>
             <p14:sldId id="279"/>
+            <p14:sldId id="282"/>
             <p14:sldId id="258"/>
             <p14:sldId id="257"/>
             <p14:sldId id="262"/>
@@ -20112,7 +20114,7 @@
           <a:p>
             <a:fld id="{78ABE3C1-DBE1-495D-B57B-2849774B866A}" type="datetimeFigureOut">
               <a:rPr lang="en-US" dirty="0"/>
-              <a:t>29/11/2019</a:t>
+              <a:t>11/29/2019</a:t>
             </a:fld>
             <a:endParaRPr lang="en-US" dirty="0"/>
           </a:p>
@@ -20159,7 +20161,7 @@
           <a:p>
             <a:fld id="{6D22F896-40B5-4ADD-8801-0D06FADFA095}" type="slidenum">
               <a:rPr lang="en-US" dirty="0"/>
-              <a:t>‹#›</a:t>
+              <a:t>‹Nº›</a:t>
             </a:fld>
             <a:endParaRPr lang="en-US" dirty="0"/>
           </a:p>
@@ -20521,7 +20523,7 @@
           <a:p>
             <a:fld id="{446C117F-5CCF-4837-BE5F-2B92066CAFAF}" type="datetimeFigureOut">
               <a:rPr lang="en-US" dirty="0"/>
-              <a:t>29/11/2019</a:t>
+              <a:t>11/29/2019</a:t>
             </a:fld>
             <a:endParaRPr lang="en-US" dirty="0"/>
           </a:p>
@@ -20568,7 +20570,7 @@
           <a:p>
             <a:fld id="{6D22F896-40B5-4ADD-8801-0D06FADFA095}" type="slidenum">
               <a:rPr lang="en-US" dirty="0"/>
-              <a:t>‹#›</a:t>
+              <a:t>‹Nº›</a:t>
             </a:fld>
             <a:endParaRPr lang="en-US" dirty="0"/>
           </a:p>
@@ -20852,7 +20854,7 @@
           <a:p>
             <a:fld id="{84EB90BD-B6CE-46B7-997F-7313B992CCDC}" type="datetimeFigureOut">
               <a:rPr lang="en-US" dirty="0"/>
-              <a:t>29/11/2019</a:t>
+              <a:t>11/29/2019</a:t>
             </a:fld>
             <a:endParaRPr lang="en-US" dirty="0"/>
           </a:p>
@@ -20899,7 +20901,7 @@
           <a:p>
             <a:fld id="{6D22F896-40B5-4ADD-8801-0D06FADFA095}" type="slidenum">
               <a:rPr lang="en-US" dirty="0"/>
-              <a:t>‹#›</a:t>
+              <a:t>‹Nº›</a:t>
             </a:fld>
             <a:endParaRPr lang="en-US" dirty="0"/>
           </a:p>
@@ -21252,7 +21254,7 @@
           <a:p>
             <a:fld id="{CDB9D11F-B188-461D-B23F-39381795C052}" type="datetimeFigureOut">
               <a:rPr lang="en-US" dirty="0"/>
-              <a:t>29/11/2019</a:t>
+              <a:t>11/29/2019</a:t>
             </a:fld>
             <a:endParaRPr lang="en-US" dirty="0"/>
           </a:p>
@@ -21299,7 +21301,7 @@
           <a:p>
             <a:fld id="{6D22F896-40B5-4ADD-8801-0D06FADFA095}" type="slidenum">
               <a:rPr lang="en-US" dirty="0"/>
-              <a:t>‹#›</a:t>
+              <a:t>‹Nº›</a:t>
             </a:fld>
             <a:endParaRPr lang="en-US" dirty="0"/>
           </a:p>
@@ -21815,7 +21817,7 @@
           <a:p>
             <a:fld id="{52E6D8D9-55A2-4063-B0F3-121F44549695}" type="datetimeFigureOut">
               <a:rPr lang="en-US" dirty="0"/>
-              <a:t>29/11/2019</a:t>
+              <a:t>11/29/2019</a:t>
             </a:fld>
             <a:endParaRPr lang="en-US" dirty="0"/>
           </a:p>
@@ -21862,7 +21864,7 @@
           <a:p>
             <a:fld id="{6D22F896-40B5-4ADD-8801-0D06FADFA095}" type="slidenum">
               <a:rPr lang="en-US" dirty="0"/>
-              <a:t>‹#›</a:t>
+              <a:t>‹Nº›</a:t>
             </a:fld>
             <a:endParaRPr lang="en-US" dirty="0"/>
           </a:p>
@@ -22491,7 +22493,7 @@
           <a:p>
             <a:fld id="{D4B24536-994D-4021-A283-9F449C0DB509}" type="datetimeFigureOut">
               <a:rPr lang="en-US" dirty="0"/>
-              <a:t>29/11/2019</a:t>
+              <a:t>11/29/2019</a:t>
             </a:fld>
             <a:endParaRPr lang="en-US" dirty="0"/>
           </a:p>
@@ -22533,7 +22535,7 @@
           <a:p>
             <a:fld id="{6D22F896-40B5-4ADD-8801-0D06FADFA095}" type="slidenum">
               <a:rPr lang="en-US" dirty="0"/>
-              <a:t>‹#›</a:t>
+              <a:t>‹Nº›</a:t>
             </a:fld>
             <a:endParaRPr lang="en-US" dirty="0"/>
           </a:p>
@@ -23399,7 +23401,7 @@
           <a:p>
             <a:fld id="{3CBBBB78-C96F-47B7-AB17-D852CA960AC9}" type="datetimeFigureOut">
               <a:rPr lang="en-US" dirty="0"/>
-              <a:t>29/11/2019</a:t>
+              <a:t>11/29/2019</a:t>
             </a:fld>
             <a:endParaRPr lang="en-US" dirty="0"/>
           </a:p>
@@ -23441,7 +23443,7 @@
           <a:p>
             <a:fld id="{6D22F896-40B5-4ADD-8801-0D06FADFA095}" type="slidenum">
               <a:rPr lang="en-US" dirty="0"/>
-              <a:t>‹#›</a:t>
+              <a:t>‹Nº›</a:t>
             </a:fld>
             <a:endParaRPr lang="en-US" dirty="0"/>
           </a:p>
@@ -23707,7 +23709,7 @@
           <a:p>
             <a:fld id="{1FA3F48C-C7C6-4055-9F49-3777875E72AE}" type="datetimeFigureOut">
               <a:rPr lang="en-US" dirty="0"/>
-              <a:t>29/11/2019</a:t>
+              <a:t>11/29/2019</a:t>
             </a:fld>
             <a:endParaRPr lang="en-US" dirty="0"/>
           </a:p>
@@ -23749,7 +23751,7 @@
           <a:p>
             <a:fld id="{6D22F896-40B5-4ADD-8801-0D06FADFA095}" type="slidenum">
               <a:rPr lang="en-US" dirty="0"/>
-              <a:t>‹#›</a:t>
+              <a:t>‹Nº›</a:t>
             </a:fld>
             <a:endParaRPr lang="en-US" dirty="0"/>
           </a:p>
@@ -23966,7 +23968,7 @@
           <a:p>
             <a:fld id="{6178E61D-D431-422C-9764-11DAFE33AB63}" type="datetimeFigureOut">
               <a:rPr lang="en-US" dirty="0"/>
-              <a:t>29/11/2019</a:t>
+              <a:t>11/29/2019</a:t>
             </a:fld>
             <a:endParaRPr lang="en-US" dirty="0"/>
           </a:p>
@@ -24023,7 +24025,7 @@
             <a:fld id="{6D22F896-40B5-4ADD-8801-0D06FADFA095}" type="slidenum">
               <a:rPr lang="en-US" dirty="0"/>
               <a:pPr/>
-              <a:t>‹#›</a:t>
+              <a:t>‹Nº›</a:t>
             </a:fld>
             <a:endParaRPr lang="en-US" dirty="0"/>
           </a:p>
@@ -24285,7 +24287,7 @@
           <a:p>
             <a:fld id="{12DE42F4-6EEF-4EF7-8ED4-2208F0F89A08}" type="datetimeFigureOut">
               <a:rPr lang="en-US" dirty="0"/>
-              <a:t>29/11/2019</a:t>
+              <a:t>11/29/2019</a:t>
             </a:fld>
             <a:endParaRPr lang="en-US" dirty="0"/>
           </a:p>
@@ -24327,7 +24329,7 @@
           <a:p>
             <a:fld id="{6D22F896-40B5-4ADD-8801-0D06FADFA095}" type="slidenum">
               <a:rPr lang="en-US" dirty="0"/>
-              <a:t>‹#›</a:t>
+              <a:t>‹Nº›</a:t>
             </a:fld>
             <a:endParaRPr lang="en-US" dirty="0"/>
           </a:p>
@@ -24669,7 +24671,7 @@
           <a:p>
             <a:fld id="{30578ACC-22D6-47C1-A373-4FD133E34F3C}" type="datetimeFigureOut">
               <a:rPr lang="en-US" dirty="0"/>
-              <a:t>29/11/2019</a:t>
+              <a:t>11/29/2019</a:t>
             </a:fld>
             <a:endParaRPr lang="en-US" dirty="0"/>
           </a:p>
@@ -24716,7 +24718,7 @@
           <a:p>
             <a:fld id="{6D22F896-40B5-4ADD-8801-0D06FADFA095}" type="slidenum">
               <a:rPr lang="en-US" dirty="0"/>
-              <a:t>‹#›</a:t>
+              <a:t>‹Nº›</a:t>
             </a:fld>
             <a:endParaRPr lang="en-US" dirty="0"/>
           </a:p>
@@ -25040,7 +25042,7 @@
           <a:p>
             <a:fld id="{4E5A6C69-6797-4E8A-BF37-F2C3751466E9}" type="datetimeFigureOut">
               <a:rPr lang="en-US" dirty="0"/>
-              <a:t>29/11/2019</a:t>
+              <a:t>11/29/2019</a:t>
             </a:fld>
             <a:endParaRPr lang="en-US" dirty="0"/>
           </a:p>
@@ -25082,7 +25084,7 @@
           <a:p>
             <a:fld id="{6D22F896-40B5-4ADD-8801-0D06FADFA095}" type="slidenum">
               <a:rPr lang="en-US" dirty="0"/>
-              <a:t>‹#›</a:t>
+              <a:t>‹Nº›</a:t>
             </a:fld>
             <a:endParaRPr lang="en-US" dirty="0"/>
           </a:p>
@@ -25541,7 +25543,7 @@
           <a:p>
             <a:fld id="{D82014A1-A632-4878-A0D3-F52BA7563730}" type="datetimeFigureOut">
               <a:rPr lang="en-US" dirty="0"/>
-              <a:t>29/11/2019</a:t>
+              <a:t>11/29/2019</a:t>
             </a:fld>
             <a:endParaRPr lang="en-US" dirty="0"/>
           </a:p>
@@ -25583,7 +25585,7 @@
           <a:p>
             <a:fld id="{6D22F896-40B5-4ADD-8801-0D06FADFA095}" type="slidenum">
               <a:rPr lang="en-US" dirty="0"/>
-              <a:t>‹#›</a:t>
+              <a:t>‹Nº›</a:t>
             </a:fld>
             <a:endParaRPr lang="en-US" dirty="0"/>
           </a:p>
@@ -25793,7 +25795,7 @@
           <a:p>
             <a:fld id="{CE99F462-093F-4566-844B-4C71F2739DA5}" type="datetimeFigureOut">
               <a:rPr lang="en-US" dirty="0"/>
-              <a:t>29/11/2019</a:t>
+              <a:t>11/29/2019</a:t>
             </a:fld>
             <a:endParaRPr lang="en-US" dirty="0"/>
           </a:p>
@@ -25835,7 +25837,7 @@
           <a:p>
             <a:fld id="{6D22F896-40B5-4ADD-8801-0D06FADFA095}" type="slidenum">
               <a:rPr lang="en-US" dirty="0"/>
-              <a:t>‹#›</a:t>
+              <a:t>‹Nº›</a:t>
             </a:fld>
             <a:endParaRPr lang="en-US" dirty="0"/>
           </a:p>
@@ -25951,7 +25953,7 @@
           <a:p>
             <a:fld id="{3D24A7AC-904D-4781-85BA-7D10C17ED021}" type="datetimeFigureOut">
               <a:rPr lang="en-US" dirty="0"/>
-              <a:t>29/11/2019</a:t>
+              <a:t>11/29/2019</a:t>
             </a:fld>
             <a:endParaRPr lang="en-US" dirty="0"/>
           </a:p>
@@ -25993,7 +25995,7 @@
           <a:p>
             <a:fld id="{6D22F896-40B5-4ADD-8801-0D06FADFA095}" type="slidenum">
               <a:rPr lang="en-US" dirty="0"/>
-              <a:t>‹#›</a:t>
+              <a:t>‹Nº›</a:t>
             </a:fld>
             <a:endParaRPr lang="en-US" dirty="0"/>
           </a:p>
@@ -26336,7 +26338,7 @@
           <a:p>
             <a:fld id="{E331444B-B92B-4E27-8C94-BB93EAF5CB18}" type="datetimeFigureOut">
               <a:rPr lang="en-US" dirty="0"/>
-              <a:t>29/11/2019</a:t>
+              <a:t>11/29/2019</a:t>
             </a:fld>
             <a:endParaRPr lang="en-US" dirty="0"/>
           </a:p>
@@ -26378,7 +26380,7 @@
           <a:p>
             <a:fld id="{6D22F896-40B5-4ADD-8801-0D06FADFA095}" type="slidenum">
               <a:rPr lang="en-US" dirty="0"/>
-              <a:t>‹#›</a:t>
+              <a:t>‹Nº›</a:t>
             </a:fld>
             <a:endParaRPr lang="en-US" dirty="0"/>
           </a:p>
@@ -26740,7 +26742,7 @@
           <a:p>
             <a:fld id="{363EFA5E-FA76-400D-B3DC-F0BA90E6D107}" type="datetimeFigureOut">
               <a:rPr lang="en-US" dirty="0"/>
-              <a:t>29/11/2019</a:t>
+              <a:t>11/29/2019</a:t>
             </a:fld>
             <a:endParaRPr lang="en-US" dirty="0"/>
           </a:p>
@@ -26782,7 +26784,7 @@
           <a:p>
             <a:fld id="{6D22F896-40B5-4ADD-8801-0D06FADFA095}" type="slidenum">
               <a:rPr lang="en-US" dirty="0"/>
-              <a:t>‹#›</a:t>
+              <a:t>‹Nº›</a:t>
             </a:fld>
             <a:endParaRPr lang="en-US" dirty="0"/>
           </a:p>
@@ -26979,7 +26981,7 @@
           <a:p>
             <a:fld id="{9D6E9DEC-419B-4CC5-A080-3B06BD5A8291}" type="datetimeFigureOut">
               <a:rPr lang="en-US" dirty="0"/>
-              <a:t>29/11/2019</a:t>
+              <a:t>11/29/2019</a:t>
             </a:fld>
             <a:endParaRPr lang="en-US" dirty="0"/>
           </a:p>
@@ -27058,7 +27060,7 @@
             <a:fld id="{6D22F896-40B5-4ADD-8801-0D06FADFA095}" type="slidenum">
               <a:rPr lang="en-US" dirty="0"/>
               <a:pPr/>
-              <a:t>‹#›</a:t>
+              <a:t>‹Nº›</a:t>
             </a:fld>
             <a:endParaRPr lang="en-US" dirty="0"/>
           </a:p>
@@ -27524,6 +27526,94 @@
           <p:cNvPr id="2" name="Título 1">
             <a:extLst>
               <a:ext uri="{FF2B5EF4-FFF2-40B4-BE49-F238E27FC236}">
+                <a16:creationId xmlns:a16="http://schemas.microsoft.com/office/drawing/2014/main" id="{37D5BD20-2C43-42C0-B780-C25DE3299815}"/>
+              </a:ext>
+            </a:extLst>
+          </p:cNvPr>
+          <p:cNvSpPr>
+            <a:spLocks noGrp="1"/>
+          </p:cNvSpPr>
+          <p:nvPr>
+            <p:ph type="title"/>
+          </p:nvPr>
+        </p:nvSpPr>
+        <p:spPr/>
+        <p:txBody>
+          <a:bodyPr/>
+          <a:lstStyle/>
+          <a:p>
+            <a:r>
+              <a:rPr lang="es-AR" dirty="0"/>
+              <a:t>“Main program” - Aplicación</a:t>
+            </a:r>
+          </a:p>
+        </p:txBody>
+      </p:sp>
+      <p:pic>
+        <p:nvPicPr>
+          <p:cNvPr id="4" name="Imagen 3" descr="Imagen que contiene captura de pantalla&#10;&#10;Descripción generada automáticamente">
+            <a:extLst>
+              <a:ext uri="{FF2B5EF4-FFF2-40B4-BE49-F238E27FC236}">
+                <a16:creationId xmlns:a16="http://schemas.microsoft.com/office/drawing/2014/main" id="{79783A38-9C69-409E-8DA3-70AD472556D3}"/>
+              </a:ext>
+            </a:extLst>
+          </p:cNvPr>
+          <p:cNvPicPr>
+            <a:picLocks noChangeAspect="1"/>
+          </p:cNvPicPr>
+          <p:nvPr/>
+        </p:nvPicPr>
+        <p:blipFill>
+          <a:blip r:embed="rId2"/>
+          <a:stretch>
+            <a:fillRect/>
+          </a:stretch>
+        </p:blipFill>
+        <p:spPr>
+          <a:xfrm>
+            <a:off x="868582" y="1977604"/>
+            <a:ext cx="9425600" cy="4883157"/>
+          </a:xfrm>
+          <a:prstGeom prst="rect">
+            <a:avLst/>
+          </a:prstGeom>
+        </p:spPr>
+      </p:pic>
+    </p:spTree>
+    <p:extLst>
+      <p:ext uri="{BB962C8B-B14F-4D97-AF65-F5344CB8AC3E}">
+        <p14:creationId xmlns:p14="http://schemas.microsoft.com/office/powerpoint/2010/main" val="548131117"/>
+      </p:ext>
+    </p:extLst>
+  </p:cSld>
+  <p:clrMapOvr>
+    <a:masterClrMapping/>
+  </p:clrMapOvr>
+</p:sld>
+</file>
+
+<file path=ppt/slides/slide11.xml><?xml version="1.0" encoding="utf-8"?>
+<p:sld xmlns:a="http://schemas.openxmlformats.org/drawingml/2006/main" xmlns:r="http://schemas.openxmlformats.org/officeDocument/2006/relationships" xmlns:p="http://schemas.openxmlformats.org/presentationml/2006/main">
+  <p:cSld>
+    <p:spTree>
+      <p:nvGrpSpPr>
+        <p:cNvPr id="1" name=""/>
+        <p:cNvGrpSpPr/>
+        <p:nvPr/>
+      </p:nvGrpSpPr>
+      <p:grpSpPr>
+        <a:xfrm>
+          <a:off x="0" y="0"/>
+          <a:ext cx="0" cy="0"/>
+          <a:chOff x="0" y="0"/>
+          <a:chExt cx="0" cy="0"/>
+        </a:xfrm>
+      </p:grpSpPr>
+      <p:sp>
+        <p:nvSpPr>
+          <p:cNvPr id="2" name="Título 1">
+            <a:extLst>
+              <a:ext uri="{FF2B5EF4-FFF2-40B4-BE49-F238E27FC236}">
                 <a16:creationId xmlns:a16="http://schemas.microsoft.com/office/drawing/2014/main" id="{A5CD2E74-C930-40CC-A742-CE7EA3DA9828}"/>
               </a:ext>
             </a:extLst>
@@ -27868,7 +27958,7 @@
 </p:sld>
 </file>
 
-<file path=ppt/slides/slide11.xml><?xml version="1.0" encoding="utf-8"?>
+<file path=ppt/slides/slide12.xml><?xml version="1.0" encoding="utf-8"?>
 <p:sld xmlns:a="http://schemas.openxmlformats.org/drawingml/2006/main" xmlns:r="http://schemas.openxmlformats.org/officeDocument/2006/relationships" xmlns:p="http://schemas.openxmlformats.org/presentationml/2006/main">
   <p:cSld>
     <p:spTree>
@@ -27951,7 +28041,7 @@
 </p:sld>
 </file>
 
-<file path=ppt/slides/slide12.xml><?xml version="1.0" encoding="utf-8"?>
+<file path=ppt/slides/slide13.xml><?xml version="1.0" encoding="utf-8"?>
 <p:sld xmlns:a="http://schemas.openxmlformats.org/drawingml/2006/main" xmlns:r="http://schemas.openxmlformats.org/officeDocument/2006/relationships" xmlns:p="http://schemas.openxmlformats.org/presentationml/2006/main">
   <p:cSld>
     <p:spTree>
@@ -28223,7 +28313,7 @@
 </p:sld>
 </file>
 
-<file path=ppt/slides/slide13.xml><?xml version="1.0" encoding="utf-8"?>
+<file path=ppt/slides/slide14.xml><?xml version="1.0" encoding="utf-8"?>
 <p:sld xmlns:a="http://schemas.openxmlformats.org/drawingml/2006/main" xmlns:r="http://schemas.openxmlformats.org/officeDocument/2006/relationships" xmlns:p="http://schemas.openxmlformats.org/presentationml/2006/main">
   <p:cSld>
     <p:spTree>
@@ -28553,7 +28643,7 @@
 </p:sld>
 </file>
 
-<file path=ppt/slides/slide14.xml><?xml version="1.0" encoding="utf-8"?>
+<file path=ppt/slides/slide15.xml><?xml version="1.0" encoding="utf-8"?>
 <p:sld xmlns:a="http://schemas.openxmlformats.org/drawingml/2006/main" xmlns:r="http://schemas.openxmlformats.org/officeDocument/2006/relationships" xmlns:p="http://schemas.openxmlformats.org/presentationml/2006/main">
   <p:cSld>
     <p:spTree>
@@ -28968,7 +29058,7 @@
 </p:sld>
 </file>
 
-<file path=ppt/slides/slide15.xml><?xml version="1.0" encoding="utf-8"?>
+<file path=ppt/slides/slide16.xml><?xml version="1.0" encoding="utf-8"?>
 <p:sld xmlns:a="http://schemas.openxmlformats.org/drawingml/2006/main" xmlns:r="http://schemas.openxmlformats.org/officeDocument/2006/relationships" xmlns:p="http://schemas.openxmlformats.org/presentationml/2006/main">
   <p:cSld>
     <p:spTree>
@@ -29066,7 +29156,7 @@
 </p:sld>
 </file>
 
-<file path=ppt/slides/slide16.xml><?xml version="1.0" encoding="utf-8"?>
+<file path=ppt/slides/slide17.xml><?xml version="1.0" encoding="utf-8"?>
 <p:sld xmlns:a="http://schemas.openxmlformats.org/drawingml/2006/main" xmlns:r="http://schemas.openxmlformats.org/officeDocument/2006/relationships" xmlns:p="http://schemas.openxmlformats.org/presentationml/2006/main">
   <p:cSld>
     <p:bg>
@@ -29408,7 +29498,7 @@
 </p:sld>
 </file>
 
-<file path=ppt/slides/slide17.xml><?xml version="1.0" encoding="utf-8"?>
+<file path=ppt/slides/slide18.xml><?xml version="1.0" encoding="utf-8"?>
 <p:sld xmlns:a="http://schemas.openxmlformats.org/drawingml/2006/main" xmlns:r="http://schemas.openxmlformats.org/officeDocument/2006/relationships" xmlns:p="http://schemas.openxmlformats.org/presentationml/2006/main">
   <p:cSld>
     <p:spTree>
@@ -29555,7 +29645,7 @@
 </p:sld>
 </file>
 
-<file path=ppt/slides/slide18.xml><?xml version="1.0" encoding="utf-8"?>
+<file path=ppt/slides/slide19.xml><?xml version="1.0" encoding="utf-8"?>
 <p:sld xmlns:a="http://schemas.openxmlformats.org/drawingml/2006/main" xmlns:r="http://schemas.openxmlformats.org/officeDocument/2006/relationships" xmlns:p="http://schemas.openxmlformats.org/presentationml/2006/main">
   <p:cSld>
     <p:spTree>
@@ -29684,132 +29774,6 @@
     <p:extLst>
       <p:ext uri="{BB962C8B-B14F-4D97-AF65-F5344CB8AC3E}">
         <p14:creationId xmlns:p14="http://schemas.microsoft.com/office/powerpoint/2010/main" val="492572831"/>
-      </p:ext>
-    </p:extLst>
-  </p:cSld>
-  <p:clrMapOvr>
-    <a:masterClrMapping/>
-  </p:clrMapOvr>
-</p:sld>
-</file>
-
-<file path=ppt/slides/slide19.xml><?xml version="1.0" encoding="utf-8"?>
-<p:sld xmlns:a="http://schemas.openxmlformats.org/drawingml/2006/main" xmlns:r="http://schemas.openxmlformats.org/officeDocument/2006/relationships" xmlns:p="http://schemas.openxmlformats.org/presentationml/2006/main">
-  <p:cSld>
-    <p:spTree>
-      <p:nvGrpSpPr>
-        <p:cNvPr id="1" name=""/>
-        <p:cNvGrpSpPr/>
-        <p:nvPr/>
-      </p:nvGrpSpPr>
-      <p:grpSpPr>
-        <a:xfrm>
-          <a:off x="0" y="0"/>
-          <a:ext cx="0" cy="0"/>
-          <a:chOff x="0" y="0"/>
-          <a:chExt cx="0" cy="0"/>
-        </a:xfrm>
-      </p:grpSpPr>
-      <p:sp>
-        <p:nvSpPr>
-          <p:cNvPr id="2" name="Título 1">
-            <a:extLst>
-              <a:ext uri="{FF2B5EF4-FFF2-40B4-BE49-F238E27FC236}">
-                <a16:creationId xmlns:a16="http://schemas.microsoft.com/office/drawing/2014/main" id="{FA540032-3C3F-44CF-B0F2-6BA666FE84E9}"/>
-              </a:ext>
-            </a:extLst>
-          </p:cNvPr>
-          <p:cNvSpPr>
-            <a:spLocks noGrp="1"/>
-          </p:cNvSpPr>
-          <p:nvPr>
-            <p:ph type="title"/>
-          </p:nvPr>
-        </p:nvSpPr>
-        <p:spPr/>
-        <p:txBody>
-          <a:bodyPr/>
-          <a:lstStyle/>
-          <a:p>
-            <a:r>
-              <a:rPr lang="es-AR" dirty="0"/>
-              <a:t>Lectura de banda magnética</a:t>
-            </a:r>
-          </a:p>
-        </p:txBody>
-      </p:sp>
-      <p:sp>
-        <p:nvSpPr>
-          <p:cNvPr id="3" name="CuadroTexto 2">
-            <a:extLst>
-              <a:ext uri="{FF2B5EF4-FFF2-40B4-BE49-F238E27FC236}">
-                <a16:creationId xmlns:a16="http://schemas.microsoft.com/office/drawing/2014/main" id="{633E9794-5113-453A-AFC1-6806F2A76A5A}"/>
-              </a:ext>
-            </a:extLst>
-          </p:cNvPr>
-          <p:cNvSpPr txBox="1"/>
-          <p:nvPr/>
-        </p:nvSpPr>
-        <p:spPr>
-          <a:xfrm>
-            <a:off x="530087" y="2319130"/>
-            <a:ext cx="10866783" cy="3908762"/>
-          </a:xfrm>
-          <a:prstGeom prst="rect">
-            <a:avLst/>
-          </a:prstGeom>
-          <a:noFill/>
-        </p:spPr>
-        <p:txBody>
-          <a:bodyPr wrap="square" rtlCol="0">
-            <a:spAutoFit/>
-          </a:bodyPr>
-          <a:lstStyle/>
-          <a:p>
-            <a:r>
-              <a:rPr lang="es-AR" sz="3200" dirty="0"/>
-              <a:t>Manejo de evento de lectura:</a:t>
-            </a:r>
-          </a:p>
-          <a:p>
-            <a:r>
-              <a:rPr lang="es-AR" sz="2400" dirty="0"/>
-              <a:t>Ante la generación de este tipo de evento, se guarda el mismo en una cola.</a:t>
-            </a:r>
-          </a:p>
-          <a:p>
-            <a:endParaRPr lang="es-AR" sz="2400" dirty="0"/>
-          </a:p>
-          <a:p>
-            <a:r>
-              <a:rPr lang="es-AR" sz="2400" dirty="0"/>
-              <a:t>Una “APP” puede indicar que se extraiga un evento de la cola</a:t>
-            </a:r>
-          </a:p>
-          <a:p>
-            <a:endParaRPr lang="es-AR" sz="2400" dirty="0"/>
-          </a:p>
-          <a:p>
-            <a:r>
-              <a:rPr lang="es-AR" sz="2400" dirty="0"/>
-              <a:t>Al extraer el evento de la cola (cuyo contenido es una serie de 1s o 0s), este es decodificado según los estándares especificados de tarjetas magnéticas</a:t>
-            </a:r>
-          </a:p>
-          <a:p>
-            <a:endParaRPr lang="es-AR" sz="2400" dirty="0"/>
-          </a:p>
-          <a:p>
-            <a:r>
-              <a:rPr lang="es-AR" sz="2400" dirty="0"/>
-              <a:t>Finalmente, la APP tiene a su disposición una PALABRA decodificada (y separada en campos según el standard) , y la validez de esta palabra.</a:t>
-            </a:r>
-          </a:p>
-        </p:txBody>
-      </p:sp>
-    </p:spTree>
-    <p:extLst>
-      <p:ext uri="{BB962C8B-B14F-4D97-AF65-F5344CB8AC3E}">
-        <p14:creationId xmlns:p14="http://schemas.microsoft.com/office/powerpoint/2010/main" val="1530338545"/>
       </p:ext>
     </p:extLst>
   </p:cSld>
@@ -29933,6 +29897,132 @@
           <p:cNvPr id="2" name="Título 1">
             <a:extLst>
               <a:ext uri="{FF2B5EF4-FFF2-40B4-BE49-F238E27FC236}">
+                <a16:creationId xmlns:a16="http://schemas.microsoft.com/office/drawing/2014/main" id="{FA540032-3C3F-44CF-B0F2-6BA666FE84E9}"/>
+              </a:ext>
+            </a:extLst>
+          </p:cNvPr>
+          <p:cNvSpPr>
+            <a:spLocks noGrp="1"/>
+          </p:cNvSpPr>
+          <p:nvPr>
+            <p:ph type="title"/>
+          </p:nvPr>
+        </p:nvSpPr>
+        <p:spPr/>
+        <p:txBody>
+          <a:bodyPr/>
+          <a:lstStyle/>
+          <a:p>
+            <a:r>
+              <a:rPr lang="es-AR" dirty="0"/>
+              <a:t>Lectura de banda magnética</a:t>
+            </a:r>
+          </a:p>
+        </p:txBody>
+      </p:sp>
+      <p:sp>
+        <p:nvSpPr>
+          <p:cNvPr id="3" name="CuadroTexto 2">
+            <a:extLst>
+              <a:ext uri="{FF2B5EF4-FFF2-40B4-BE49-F238E27FC236}">
+                <a16:creationId xmlns:a16="http://schemas.microsoft.com/office/drawing/2014/main" id="{633E9794-5113-453A-AFC1-6806F2A76A5A}"/>
+              </a:ext>
+            </a:extLst>
+          </p:cNvPr>
+          <p:cNvSpPr txBox="1"/>
+          <p:nvPr/>
+        </p:nvSpPr>
+        <p:spPr>
+          <a:xfrm>
+            <a:off x="530087" y="2319130"/>
+            <a:ext cx="10866783" cy="3908762"/>
+          </a:xfrm>
+          <a:prstGeom prst="rect">
+            <a:avLst/>
+          </a:prstGeom>
+          <a:noFill/>
+        </p:spPr>
+        <p:txBody>
+          <a:bodyPr wrap="square" rtlCol="0">
+            <a:spAutoFit/>
+          </a:bodyPr>
+          <a:lstStyle/>
+          <a:p>
+            <a:r>
+              <a:rPr lang="es-AR" sz="3200" dirty="0"/>
+              <a:t>Manejo de evento de lectura:</a:t>
+            </a:r>
+          </a:p>
+          <a:p>
+            <a:r>
+              <a:rPr lang="es-AR" sz="2400" dirty="0"/>
+              <a:t>Ante la generación de este tipo de evento, se guarda el mismo en una cola.</a:t>
+            </a:r>
+          </a:p>
+          <a:p>
+            <a:endParaRPr lang="es-AR" sz="2400" dirty="0"/>
+          </a:p>
+          <a:p>
+            <a:r>
+              <a:rPr lang="es-AR" sz="2400" dirty="0"/>
+              <a:t>Una “APP” puede indicar que se extraiga un evento de la cola</a:t>
+            </a:r>
+          </a:p>
+          <a:p>
+            <a:endParaRPr lang="es-AR" sz="2400" dirty="0"/>
+          </a:p>
+          <a:p>
+            <a:r>
+              <a:rPr lang="es-AR" sz="2400" dirty="0"/>
+              <a:t>Al extraer el evento de la cola (cuyo contenido es una serie de 1s o 0s), este es decodificado según los estándares especificados de tarjetas magnéticas</a:t>
+            </a:r>
+          </a:p>
+          <a:p>
+            <a:endParaRPr lang="es-AR" sz="2400" dirty="0"/>
+          </a:p>
+          <a:p>
+            <a:r>
+              <a:rPr lang="es-AR" sz="2400" dirty="0"/>
+              <a:t>Finalmente, la APP tiene a su disposición una PALABRA decodificada (y separada en campos según el standard) , y la validez de esta palabra.</a:t>
+            </a:r>
+          </a:p>
+        </p:txBody>
+      </p:sp>
+    </p:spTree>
+    <p:extLst>
+      <p:ext uri="{BB962C8B-B14F-4D97-AF65-F5344CB8AC3E}">
+        <p14:creationId xmlns:p14="http://schemas.microsoft.com/office/powerpoint/2010/main" val="1530338545"/>
+      </p:ext>
+    </p:extLst>
+  </p:cSld>
+  <p:clrMapOvr>
+    <a:masterClrMapping/>
+  </p:clrMapOvr>
+</p:sld>
+</file>
+
+<file path=ppt/slides/slide21.xml><?xml version="1.0" encoding="utf-8"?>
+<p:sld xmlns:a="http://schemas.openxmlformats.org/drawingml/2006/main" xmlns:r="http://schemas.openxmlformats.org/officeDocument/2006/relationships" xmlns:p="http://schemas.openxmlformats.org/presentationml/2006/main">
+  <p:cSld>
+    <p:spTree>
+      <p:nvGrpSpPr>
+        <p:cNvPr id="1" name=""/>
+        <p:cNvGrpSpPr/>
+        <p:nvPr/>
+      </p:nvGrpSpPr>
+      <p:grpSpPr>
+        <a:xfrm>
+          <a:off x="0" y="0"/>
+          <a:ext cx="0" cy="0"/>
+          <a:chOff x="0" y="0"/>
+          <a:chExt cx="0" cy="0"/>
+        </a:xfrm>
+      </p:grpSpPr>
+      <p:sp>
+        <p:nvSpPr>
+          <p:cNvPr id="2" name="Título 1">
+            <a:extLst>
+              <a:ext uri="{FF2B5EF4-FFF2-40B4-BE49-F238E27FC236}">
                 <a16:creationId xmlns:a16="http://schemas.microsoft.com/office/drawing/2014/main" id="{31B5D5F5-0C93-4318-9806-DB700321A128}"/>
               </a:ext>
             </a:extLst>
@@ -30034,7 +30124,7 @@
 </p:sld>
 </file>
 
-<file path=ppt/slides/slide21.xml><?xml version="1.0" encoding="utf-8"?>
+<file path=ppt/slides/slide22.xml><?xml version="1.0" encoding="utf-8"?>
 <p:sld xmlns:a="http://schemas.openxmlformats.org/drawingml/2006/main" xmlns:r="http://schemas.openxmlformats.org/officeDocument/2006/relationships" xmlns:p="http://schemas.openxmlformats.org/presentationml/2006/main">
   <p:cSld>
     <p:spTree>
@@ -30163,7 +30253,7 @@
 </p:sld>
 </file>
 
-<file path=ppt/slides/slide22.xml><?xml version="1.0" encoding="utf-8"?>
+<file path=ppt/slides/slide23.xml><?xml version="1.0" encoding="utf-8"?>
 <p:sld xmlns:a="http://schemas.openxmlformats.org/drawingml/2006/main" xmlns:r="http://schemas.openxmlformats.org/officeDocument/2006/relationships" xmlns:p="http://schemas.openxmlformats.org/presentationml/2006/main">
   <p:cSld>
     <p:spTree>
@@ -30488,7 +30578,7 @@
 </p:sld>
 </file>
 
-<file path=ppt/slides/slide23.xml><?xml version="1.0" encoding="utf-8"?>
+<file path=ppt/slides/slide24.xml><?xml version="1.0" encoding="utf-8"?>
 <p:sld xmlns:a="http://schemas.openxmlformats.org/drawingml/2006/main" xmlns:r="http://schemas.openxmlformats.org/officeDocument/2006/relationships" xmlns:p="http://schemas.openxmlformats.org/presentationml/2006/main">
   <p:cSld>
     <p:bg>
@@ -31147,7 +31237,7 @@
 </p:sld>
 </file>
 
-<file path=ppt/slides/slide24.xml><?xml version="1.0" encoding="utf-8"?>
+<file path=ppt/slides/slide25.xml><?xml version="1.0" encoding="utf-8"?>
 <p:sld xmlns:a="http://schemas.openxmlformats.org/drawingml/2006/main" xmlns:r="http://schemas.openxmlformats.org/officeDocument/2006/relationships" xmlns:p="http://schemas.openxmlformats.org/presentationml/2006/main">
   <p:cSld>
     <p:bg>
@@ -31633,7 +31723,7 @@
 </p:sld>
 </file>
 
-<file path=ppt/slides/slide25.xml><?xml version="1.0" encoding="utf-8"?>
+<file path=ppt/slides/slide26.xml><?xml version="1.0" encoding="utf-8"?>
 <p:sld xmlns:a="http://schemas.openxmlformats.org/drawingml/2006/main" xmlns:r="http://schemas.openxmlformats.org/officeDocument/2006/relationships" xmlns:p="http://schemas.openxmlformats.org/presentationml/2006/main">
   <p:cSld>
     <p:bg>
@@ -32641,6 +32731,36 @@
           </a:p>
         </p:txBody>
       </p:sp>
+      <p:pic>
+        <p:nvPicPr>
+          <p:cNvPr id="4" name="Imagen 3" descr="Captura de pantalla de un celular&#10;&#10;Descripción generada automáticamente">
+            <a:extLst>
+              <a:ext uri="{FF2B5EF4-FFF2-40B4-BE49-F238E27FC236}">
+                <a16:creationId xmlns:a16="http://schemas.microsoft.com/office/drawing/2014/main" id="{85D4089B-A44E-4FDD-99A6-E826EEE6FB40}"/>
+              </a:ext>
+            </a:extLst>
+          </p:cNvPr>
+          <p:cNvPicPr>
+            <a:picLocks noChangeAspect="1"/>
+          </p:cNvPicPr>
+          <p:nvPr/>
+        </p:nvPicPr>
+        <p:blipFill>
+          <a:blip r:embed="rId2"/>
+          <a:stretch>
+            <a:fillRect/>
+          </a:stretch>
+        </p:blipFill>
+        <p:spPr>
+          <a:xfrm>
+            <a:off x="1019480" y="2453882"/>
+            <a:ext cx="9840777" cy="3327940"/>
+          </a:xfrm>
+          <a:prstGeom prst="rect">
+            <a:avLst/>
+          </a:prstGeom>
+        </p:spPr>
+      </p:pic>
     </p:spTree>
     <p:extLst>
       <p:ext uri="{BB962C8B-B14F-4D97-AF65-F5344CB8AC3E}">
@@ -32655,6 +32775,115 @@
 </file>
 
 <file path=ppt/slides/slide7.xml><?xml version="1.0" encoding="utf-8"?>
+<p:sld xmlns:a="http://schemas.openxmlformats.org/drawingml/2006/main" xmlns:r="http://schemas.openxmlformats.org/officeDocument/2006/relationships" xmlns:p="http://schemas.openxmlformats.org/presentationml/2006/main">
+  <p:cSld>
+    <p:spTree>
+      <p:nvGrpSpPr>
+        <p:cNvPr id="1" name=""/>
+        <p:cNvGrpSpPr/>
+        <p:nvPr/>
+      </p:nvGrpSpPr>
+      <p:grpSpPr>
+        <a:xfrm>
+          <a:off x="0" y="0"/>
+          <a:ext cx="0" cy="0"/>
+          <a:chOff x="0" y="0"/>
+          <a:chExt cx="0" cy="0"/>
+        </a:xfrm>
+      </p:grpSpPr>
+      <p:sp>
+        <p:nvSpPr>
+          <p:cNvPr id="2" name="Título 1">
+            <a:extLst>
+              <a:ext uri="{FF2B5EF4-FFF2-40B4-BE49-F238E27FC236}">
+                <a16:creationId xmlns:a16="http://schemas.microsoft.com/office/drawing/2014/main" id="{2CC27856-7D9A-411D-88D5-6372F5DD192E}"/>
+              </a:ext>
+            </a:extLst>
+          </p:cNvPr>
+          <p:cNvSpPr>
+            <a:spLocks noGrp="1"/>
+          </p:cNvSpPr>
+          <p:nvPr>
+            <p:ph type="title"/>
+          </p:nvPr>
+        </p:nvSpPr>
+        <p:spPr/>
+        <p:txBody>
+          <a:bodyPr/>
+          <a:lstStyle/>
+          <a:p>
+            <a:r>
+              <a:rPr lang="es-AR" dirty="0"/>
+              <a:t>Timing </a:t>
+            </a:r>
+            <a:r>
+              <a:rPr lang="es-AR" dirty="0" err="1"/>
+              <a:t>results</a:t>
+            </a:r>
+            <a:endParaRPr lang="es-AR" dirty="0"/>
+          </a:p>
+        </p:txBody>
+      </p:sp>
+      <p:sp>
+        <p:nvSpPr>
+          <p:cNvPr id="3" name="CuadroTexto 2">
+            <a:extLst>
+              <a:ext uri="{FF2B5EF4-FFF2-40B4-BE49-F238E27FC236}">
+                <a16:creationId xmlns:a16="http://schemas.microsoft.com/office/drawing/2014/main" id="{94EE6686-B3E4-4F79-BA10-D3FCCDE53E08}"/>
+              </a:ext>
+            </a:extLst>
+          </p:cNvPr>
+          <p:cNvSpPr txBox="1"/>
+          <p:nvPr/>
+        </p:nvSpPr>
+        <p:spPr>
+          <a:xfrm>
+            <a:off x="1167618" y="2602523"/>
+            <a:ext cx="7469945" cy="1200329"/>
+          </a:xfrm>
+          <a:prstGeom prst="rect">
+            <a:avLst/>
+          </a:prstGeom>
+          <a:noFill/>
+        </p:spPr>
+        <p:txBody>
+          <a:bodyPr wrap="square" rtlCol="0">
+            <a:spAutoFit/>
+          </a:bodyPr>
+          <a:lstStyle/>
+          <a:p>
+            <a:r>
+              <a:rPr lang="es-AR" sz="3600" dirty="0"/>
+              <a:t>Porcentaje de uso normal: 45%</a:t>
+            </a:r>
+          </a:p>
+          <a:p>
+            <a:r>
+              <a:rPr lang="es-AR" sz="3600" dirty="0"/>
+              <a:t>Picos de uso</a:t>
+            </a:r>
+            <a:r>
+              <a:rPr lang="es-AR" sz="3600"/>
+              <a:t>: 55%</a:t>
+            </a:r>
+            <a:endParaRPr lang="es-AR" sz="3600" dirty="0"/>
+          </a:p>
+        </p:txBody>
+      </p:sp>
+    </p:spTree>
+    <p:extLst>
+      <p:ext uri="{BB962C8B-B14F-4D97-AF65-F5344CB8AC3E}">
+        <p14:creationId xmlns:p14="http://schemas.microsoft.com/office/powerpoint/2010/main" val="950188641"/>
+      </p:ext>
+    </p:extLst>
+  </p:cSld>
+  <p:clrMapOvr>
+    <a:masterClrMapping/>
+  </p:clrMapOvr>
+</p:sld>
+</file>
+
+<file path=ppt/slides/slide8.xml><?xml version="1.0" encoding="utf-8"?>
 <p:sld xmlns:a="http://schemas.openxmlformats.org/drawingml/2006/main" xmlns:r="http://schemas.openxmlformats.org/officeDocument/2006/relationships" xmlns:p="http://schemas.openxmlformats.org/presentationml/2006/main">
   <p:cSld>
     <p:spTree>
@@ -32712,7 +32941,7 @@
 </p:sld>
 </file>
 
-<file path=ppt/slides/slide8.xml><?xml version="1.0" encoding="utf-8"?>
+<file path=ppt/slides/slide9.xml><?xml version="1.0" encoding="utf-8"?>
 <p:sld xmlns:a="http://schemas.openxmlformats.org/drawingml/2006/main" xmlns:r="http://schemas.openxmlformats.org/officeDocument/2006/relationships" xmlns:p="http://schemas.openxmlformats.org/presentationml/2006/main">
   <p:cSld>
     <p:spTree>
@@ -33924,94 +34153,6 @@
 </p:sld>
 </file>
 
-<file path=ppt/slides/slide9.xml><?xml version="1.0" encoding="utf-8"?>
-<p:sld xmlns:a="http://schemas.openxmlformats.org/drawingml/2006/main" xmlns:r="http://schemas.openxmlformats.org/officeDocument/2006/relationships" xmlns:p="http://schemas.openxmlformats.org/presentationml/2006/main">
-  <p:cSld>
-    <p:spTree>
-      <p:nvGrpSpPr>
-        <p:cNvPr id="1" name=""/>
-        <p:cNvGrpSpPr/>
-        <p:nvPr/>
-      </p:nvGrpSpPr>
-      <p:grpSpPr>
-        <a:xfrm>
-          <a:off x="0" y="0"/>
-          <a:ext cx="0" cy="0"/>
-          <a:chOff x="0" y="0"/>
-          <a:chExt cx="0" cy="0"/>
-        </a:xfrm>
-      </p:grpSpPr>
-      <p:sp>
-        <p:nvSpPr>
-          <p:cNvPr id="2" name="Título 1">
-            <a:extLst>
-              <a:ext uri="{FF2B5EF4-FFF2-40B4-BE49-F238E27FC236}">
-                <a16:creationId xmlns:a16="http://schemas.microsoft.com/office/drawing/2014/main" id="{37D5BD20-2C43-42C0-B780-C25DE3299815}"/>
-              </a:ext>
-            </a:extLst>
-          </p:cNvPr>
-          <p:cNvSpPr>
-            <a:spLocks noGrp="1"/>
-          </p:cNvSpPr>
-          <p:nvPr>
-            <p:ph type="title"/>
-          </p:nvPr>
-        </p:nvSpPr>
-        <p:spPr/>
-        <p:txBody>
-          <a:bodyPr/>
-          <a:lstStyle/>
-          <a:p>
-            <a:r>
-              <a:rPr lang="es-AR" dirty="0"/>
-              <a:t>“Main program” - Aplicación</a:t>
-            </a:r>
-          </a:p>
-        </p:txBody>
-      </p:sp>
-      <p:pic>
-        <p:nvPicPr>
-          <p:cNvPr id="4" name="Imagen 3" descr="Imagen que contiene captura de pantalla&#10;&#10;Descripción generada automáticamente">
-            <a:extLst>
-              <a:ext uri="{FF2B5EF4-FFF2-40B4-BE49-F238E27FC236}">
-                <a16:creationId xmlns:a16="http://schemas.microsoft.com/office/drawing/2014/main" id="{79783A38-9C69-409E-8DA3-70AD472556D3}"/>
-              </a:ext>
-            </a:extLst>
-          </p:cNvPr>
-          <p:cNvPicPr>
-            <a:picLocks noChangeAspect="1"/>
-          </p:cNvPicPr>
-          <p:nvPr/>
-        </p:nvPicPr>
-        <p:blipFill>
-          <a:blip r:embed="rId2"/>
-          <a:stretch>
-            <a:fillRect/>
-          </a:stretch>
-        </p:blipFill>
-        <p:spPr>
-          <a:xfrm>
-            <a:off x="868582" y="1977604"/>
-            <a:ext cx="9425600" cy="4883157"/>
-          </a:xfrm>
-          <a:prstGeom prst="rect">
-            <a:avLst/>
-          </a:prstGeom>
-        </p:spPr>
-      </p:pic>
-    </p:spTree>
-    <p:extLst>
-      <p:ext uri="{BB962C8B-B14F-4D97-AF65-F5344CB8AC3E}">
-        <p14:creationId xmlns:p14="http://schemas.microsoft.com/office/powerpoint/2010/main" val="548131117"/>
-      </p:ext>
-    </p:extLst>
-  </p:cSld>
-  <p:clrMapOvr>
-    <a:masterClrMapping/>
-  </p:clrMapOvr>
-</p:sld>
-</file>
-
 <file path=ppt/theme/theme1.xml><?xml version="1.0" encoding="utf-8"?>
 <a:theme xmlns:a="http://schemas.openxmlformats.org/drawingml/2006/main" name="Berlín">
   <a:themeElements>

</xml_diff>